<commit_message>
problems with background image
</commit_message>
<xml_diff>
--- a/Logos/techno power.pptx
+++ b/Logos/techno power.pptx
@@ -107,6 +107,11 @@
       </a:defRPr>
     </a:lvl9pPr>
   </p:defaultTextStyle>
+  <p:extLst>
+    <p:ext uri="{EFAFB233-063F-42B5-8137-9DF3F51BA10A}">
+      <p15:sldGuideLst xmlns:p15="http://schemas.microsoft.com/office/powerpoint/2012/main"/>
+    </p:ext>
+  </p:extLst>
 </p:presentation>
 </file>
 
@@ -192,7 +197,7 @@
           <a:p>
             <a:fld id="{FEFCFD11-7C27-694A-91DB-0CA583F42E09}" type="datetimeFigureOut">
               <a:rPr lang="en-US" smtClean="0"/>
-              <a:t>7/20/17</a:t>
+              <a:t>7/22/17</a:t>
             </a:fld>
             <a:endParaRPr lang="en-US"/>
           </a:p>
@@ -680,7 +685,7 @@
           <a:p>
             <a:fld id="{E739D8C5-BAAC-8144-B877-9A28818F2937}" type="datetimeFigureOut">
               <a:rPr lang="en-US" smtClean="0"/>
-              <a:t>7/20/17</a:t>
+              <a:t>7/22/17</a:t>
             </a:fld>
             <a:endParaRPr lang="en-US"/>
           </a:p>
@@ -845,7 +850,7 @@
           <a:p>
             <a:fld id="{E739D8C5-BAAC-8144-B877-9A28818F2937}" type="datetimeFigureOut">
               <a:rPr lang="en-US" smtClean="0"/>
-              <a:t>7/20/17</a:t>
+              <a:t>7/22/17</a:t>
             </a:fld>
             <a:endParaRPr lang="en-US"/>
           </a:p>
@@ -1020,7 +1025,7 @@
           <a:p>
             <a:fld id="{E739D8C5-BAAC-8144-B877-9A28818F2937}" type="datetimeFigureOut">
               <a:rPr lang="en-US" smtClean="0"/>
-              <a:t>7/20/17</a:t>
+              <a:t>7/22/17</a:t>
             </a:fld>
             <a:endParaRPr lang="en-US"/>
           </a:p>
@@ -1185,7 +1190,7 @@
           <a:p>
             <a:fld id="{E739D8C5-BAAC-8144-B877-9A28818F2937}" type="datetimeFigureOut">
               <a:rPr lang="en-US" smtClean="0"/>
-              <a:t>7/20/17</a:t>
+              <a:t>7/22/17</a:t>
             </a:fld>
             <a:endParaRPr lang="en-US"/>
           </a:p>
@@ -1426,7 +1431,7 @@
           <a:p>
             <a:fld id="{E739D8C5-BAAC-8144-B877-9A28818F2937}" type="datetimeFigureOut">
               <a:rPr lang="en-US" smtClean="0"/>
-              <a:t>7/20/17</a:t>
+              <a:t>7/22/17</a:t>
             </a:fld>
             <a:endParaRPr lang="en-US"/>
           </a:p>
@@ -1653,7 +1658,7 @@
           <a:p>
             <a:fld id="{E739D8C5-BAAC-8144-B877-9A28818F2937}" type="datetimeFigureOut">
               <a:rPr lang="en-US" smtClean="0"/>
-              <a:t>7/20/17</a:t>
+              <a:t>7/22/17</a:t>
             </a:fld>
             <a:endParaRPr lang="en-US"/>
           </a:p>
@@ -2015,7 +2020,7 @@
           <a:p>
             <a:fld id="{E739D8C5-BAAC-8144-B877-9A28818F2937}" type="datetimeFigureOut">
               <a:rPr lang="en-US" smtClean="0"/>
-              <a:t>7/20/17</a:t>
+              <a:t>7/22/17</a:t>
             </a:fld>
             <a:endParaRPr lang="en-US"/>
           </a:p>
@@ -2128,7 +2133,7 @@
           <a:p>
             <a:fld id="{E739D8C5-BAAC-8144-B877-9A28818F2937}" type="datetimeFigureOut">
               <a:rPr lang="en-US" smtClean="0"/>
-              <a:t>7/20/17</a:t>
+              <a:t>7/22/17</a:t>
             </a:fld>
             <a:endParaRPr lang="en-US"/>
           </a:p>
@@ -2218,7 +2223,7 @@
           <a:p>
             <a:fld id="{E739D8C5-BAAC-8144-B877-9A28818F2937}" type="datetimeFigureOut">
               <a:rPr lang="en-US" smtClean="0"/>
-              <a:t>7/20/17</a:t>
+              <a:t>7/22/17</a:t>
             </a:fld>
             <a:endParaRPr lang="en-US"/>
           </a:p>
@@ -2490,7 +2495,7 @@
           <a:p>
             <a:fld id="{E739D8C5-BAAC-8144-B877-9A28818F2937}" type="datetimeFigureOut">
               <a:rPr lang="en-US" smtClean="0"/>
-              <a:t>7/20/17</a:t>
+              <a:t>7/22/17</a:t>
             </a:fld>
             <a:endParaRPr lang="en-US"/>
           </a:p>
@@ -2742,7 +2747,7 @@
           <a:p>
             <a:fld id="{E739D8C5-BAAC-8144-B877-9A28818F2937}" type="datetimeFigureOut">
               <a:rPr lang="en-US" smtClean="0"/>
-              <a:t>7/20/17</a:t>
+              <a:t>7/22/17</a:t>
             </a:fld>
             <a:endParaRPr lang="en-US"/>
           </a:p>
@@ -2950,7 +2955,7 @@
           <a:p>
             <a:fld id="{E739D8C5-BAAC-8144-B877-9A28818F2937}" type="datetimeFigureOut">
               <a:rPr lang="en-US" smtClean="0"/>
-              <a:t>7/20/17</a:t>
+              <a:t>7/22/17</a:t>
             </a:fld>
             <a:endParaRPr lang="en-US"/>
           </a:p>
@@ -3363,36 +3368,6 @@
           <a:chExt cx="0" cy="0"/>
         </a:xfrm>
       </p:grpSpPr>
-      <p:pic>
-        <p:nvPicPr>
-          <p:cNvPr id="4" name="Picture 3"/>
-          <p:cNvPicPr>
-            <a:picLocks noChangeAspect="1"/>
-          </p:cNvPicPr>
-          <p:nvPr/>
-        </p:nvPicPr>
-        <p:blipFill>
-          <a:blip r:embed="rId3">
-            <a:extLst>
-              <a:ext uri="{28A0092B-C50C-407E-A947-70E740481C1C}">
-                <a14:useLocalDpi xmlns:a14="http://schemas.microsoft.com/office/drawing/2010/main" val="0"/>
-              </a:ext>
-            </a:extLst>
-          </a:blip>
-          <a:stretch>
-            <a:fillRect/>
-          </a:stretch>
-        </p:blipFill>
-        <p:spPr>
-          <a:xfrm>
-            <a:off x="45696" y="665816"/>
-            <a:ext cx="21610344" cy="8904904"/>
-          </a:xfrm>
-          <a:prstGeom prst="rect">
-            <a:avLst/>
-          </a:prstGeom>
-        </p:spPr>
-      </p:pic>
       <p:sp>
         <p:nvSpPr>
           <p:cNvPr id="5" name="Rectangle 4"/>
@@ -3577,6 +3552,36 @@
           </a:p>
         </p:txBody>
       </p:sp>
+      <p:pic>
+        <p:nvPicPr>
+          <p:cNvPr id="10" name="Picture 9"/>
+          <p:cNvPicPr>
+            <a:picLocks noChangeAspect="1"/>
+          </p:cNvPicPr>
+          <p:nvPr/>
+        </p:nvPicPr>
+        <p:blipFill>
+          <a:blip r:embed="rId3">
+            <a:extLst>
+              <a:ext uri="{28A0092B-C50C-407E-A947-70E740481C1C}">
+                <a14:useLocalDpi xmlns:a14="http://schemas.microsoft.com/office/drawing/2010/main" val="0"/>
+              </a:ext>
+            </a:extLst>
+          </a:blip>
+          <a:stretch>
+            <a:fillRect/>
+          </a:stretch>
+        </p:blipFill>
+        <p:spPr>
+          <a:xfrm>
+            <a:off x="1892690" y="-3686587"/>
+            <a:ext cx="18038300" cy="17995454"/>
+          </a:xfrm>
+          <a:prstGeom prst="rect">
+            <a:avLst/>
+          </a:prstGeom>
+        </p:spPr>
+      </p:pic>
     </p:spTree>
     <p:extLst>
       <p:ext uri="{BB962C8B-B14F-4D97-AF65-F5344CB8AC3E}">

</xml_diff>